<commit_message>
Slide update to RC
</commit_message>
<xml_diff>
--- a/Going Beyond ReSharper with Roslyn.pptx
+++ b/Going Beyond ReSharper with Roslyn.pptx
@@ -5,10 +5,10 @@
     <p:sldMasterId id="2147484082" r:id="rId4"/>
   </p:sldMasterIdLst>
   <p:notesMasterIdLst>
-    <p:notesMasterId r:id="rId20"/>
+    <p:notesMasterId r:id="rId21"/>
   </p:notesMasterIdLst>
   <p:handoutMasterIdLst>
-    <p:handoutMasterId r:id="rId21"/>
+    <p:handoutMasterId r:id="rId22"/>
   </p:handoutMasterIdLst>
   <p:sldIdLst>
     <p:sldId id="1152" r:id="rId5"/>
@@ -26,6 +26,7 @@
     <p:sldId id="1163" r:id="rId17"/>
     <p:sldId id="1164" r:id="rId18"/>
     <p:sldId id="1166" r:id="rId19"/>
+    <p:sldId id="1169" r:id="rId20"/>
   </p:sldIdLst>
   <p:sldSz cx="12436475" cy="6994525"/>
   <p:notesSz cx="6858000" cy="9144000"/>
@@ -144,6 +145,7 @@
             <p14:sldId id="1163"/>
             <p14:sldId id="1164"/>
             <p14:sldId id="1166"/>
+            <p14:sldId id="1169"/>
           </p14:sldIdLst>
         </p14:section>
       </p14:sectionLst>
@@ -263,7 +265,7 @@
               <a:rPr lang="en-US" smtClean="0">
                 <a:latin typeface="Segoe UI" pitchFamily="34" charset="0"/>
               </a:rPr>
-              <a:t>4/23/2015 10:15 AM</a:t>
+              <a:t>5/11/2015 10:12 AM</a:t>
             </a:fld>
             <a:endParaRPr lang="en-US" dirty="0">
               <a:latin typeface="Segoe UI" pitchFamily="34" charset="0"/>
@@ -561,7 +563,7 @@
           <a:p>
             <a:fld id="{2DFDA5C7-BBAE-481E-8BF7-731156A2E2C1}" type="datetime8">
               <a:rPr lang="en-US" smtClean="0"/>
-              <a:t>4/23/2015 10:15 AM</a:t>
+              <a:t>5/11/2015 10:12 AM</a:t>
             </a:fld>
             <a:endParaRPr lang="en-US" dirty="0"/>
           </a:p>
@@ -937,7 +939,7 @@
           <a:p>
             <a:fld id="{2DFDA5C7-BBAE-481E-8BF7-731156A2E2C1}" type="datetime8">
               <a:rPr lang="en-US" smtClean="0"/>
-              <a:t>4/23/2015 10:15 AM</a:t>
+              <a:t>5/11/2015 10:12 AM</a:t>
             </a:fld>
             <a:endParaRPr lang="en-US" dirty="0"/>
           </a:p>
@@ -1110,7 +1112,7 @@
           <a:p>
             <a:fld id="{2DFDA5C7-BBAE-481E-8BF7-731156A2E2C1}" type="datetime8">
               <a:rPr lang="en-US" smtClean="0"/>
-              <a:t>4/23/2015 10:15 AM</a:t>
+              <a:t>5/11/2015 10:12 AM</a:t>
             </a:fld>
             <a:endParaRPr lang="en-US" dirty="0"/>
           </a:p>
@@ -1283,7 +1285,7 @@
           <a:p>
             <a:fld id="{2DFDA5C7-BBAE-481E-8BF7-731156A2E2C1}" type="datetime8">
               <a:rPr lang="en-US" smtClean="0"/>
-              <a:t>4/23/2015 10:15 AM</a:t>
+              <a:t>5/11/2015 10:12 AM</a:t>
             </a:fld>
             <a:endParaRPr lang="en-US" dirty="0"/>
           </a:p>
@@ -1456,7 +1458,7 @@
           <a:p>
             <a:fld id="{2DFDA5C7-BBAE-481E-8BF7-731156A2E2C1}" type="datetime8">
               <a:rPr lang="en-US" smtClean="0"/>
-              <a:t>4/23/2015 10:15 AM</a:t>
+              <a:t>5/11/2015 10:12 AM</a:t>
             </a:fld>
             <a:endParaRPr lang="en-US" dirty="0"/>
           </a:p>
@@ -1629,7 +1631,7 @@
           <a:p>
             <a:fld id="{2DFDA5C7-BBAE-481E-8BF7-731156A2E2C1}" type="datetime8">
               <a:rPr lang="en-US" smtClean="0"/>
-              <a:t>4/23/2015 10:15 AM</a:t>
+              <a:t>5/11/2015 10:12 AM</a:t>
             </a:fld>
             <a:endParaRPr lang="en-US" dirty="0"/>
           </a:p>
@@ -5843,7 +5845,7 @@
         <p:spPr>
           <a:xfrm>
             <a:off x="274638" y="1212850"/>
-            <a:ext cx="11887200" cy="5539978"/>
+            <a:ext cx="11887200" cy="2252924"/>
           </a:xfrm>
         </p:spPr>
         <p:txBody>
@@ -5880,35 +5882,21 @@
           <a:p>
             <a:r>
               <a:rPr lang="en-US" sz="3200" dirty="0"/>
-              <a:t>Change Vsix Version</a:t>
-            </a:r>
-          </a:p>
-          <a:p>
+              <a:t>Change </a:t>
+            </a:r>
+            <a:r>
+              <a:rPr lang="en-US" sz="3200" dirty="0" err="1"/>
+              <a:t>Vsix</a:t>
+            </a:r>
             <a:r>
               <a:rPr lang="en-US" sz="3200" dirty="0"/>
-              <a:t>Close Test Application Before Debugging (CTP?)</a:t>
-            </a:r>
-          </a:p>
-          <a:p>
-            <a:r>
-              <a:rPr lang="en-US" sz="3200" dirty="0"/>
-              <a:t>Log Out/In Normal &amp; Experimental Visual Studio Instances (CTP?)</a:t>
-            </a:r>
-          </a:p>
-          <a:p>
-            <a:r>
-              <a:rPr lang="en-US" sz="3200" dirty="0"/>
-              <a:t>NuGet Bug Going From CTP5 to CTP 6</a:t>
-            </a:r>
-          </a:p>
-          <a:p>
-            <a:r>
-              <a:rPr lang="en-US" sz="3200" dirty="0"/>
-              <a:t>Refactoring Project Targets Wrong Version of .NET Framework (CTP?)</a:t>
-            </a:r>
-          </a:p>
-          <a:p>
-            <a:endParaRPr lang="en-US" dirty="0"/>
+              <a:t> </a:t>
+            </a:r>
+            <a:r>
+              <a:rPr lang="en-US" sz="3200" dirty="0" smtClean="0"/>
+              <a:t>Version</a:t>
+            </a:r>
+            <a:endParaRPr lang="en-US" sz="3200" dirty="0"/>
           </a:p>
         </p:txBody>
       </p:sp>
@@ -5988,7 +5976,7 @@
         <p:spPr>
           <a:xfrm>
             <a:off x="274638" y="1212850"/>
-            <a:ext cx="12041540" cy="4351961"/>
+            <a:ext cx="12041540" cy="3133165"/>
           </a:xfrm>
         </p:spPr>
         <p:txBody>
@@ -6020,37 +6008,6 @@
             </a:pPr>
             <a:endParaRPr lang="en-US" sz="3600" dirty="0" smtClean="0"/>
           </a:p>
-          <a:p>
-            <a:pPr marL="0" indent="0">
-              <a:buNone/>
-            </a:pPr>
-            <a:r>
-              <a:rPr lang="en-US" u="sng" dirty="0" smtClean="0"/>
-              <a:t>Sample Code &amp; Slides</a:t>
-            </a:r>
-          </a:p>
-          <a:p>
-            <a:pPr marL="0" indent="0">
-              <a:buNone/>
-            </a:pPr>
-            <a:r>
-              <a:rPr lang="en-US" sz="3200" dirty="0" smtClean="0"/>
-              <a:t>github.com/</a:t>
-            </a:r>
-            <a:r>
-              <a:rPr lang="en-US" sz="3200" dirty="0" err="1" smtClean="0"/>
-              <a:t>jlattimer</a:t>
-            </a:r>
-            <a:r>
-              <a:rPr lang="en-US" sz="3200" dirty="0" smtClean="0"/>
-              <a:t>/</a:t>
-            </a:r>
-            <a:r>
-              <a:rPr lang="en-US" sz="3200" dirty="0" err="1" smtClean="0"/>
-              <a:t>GoingBeyondReSharperWithRoslyn_Demo</a:t>
-            </a:r>
-            <a:endParaRPr lang="en-US" sz="3200" dirty="0"/>
-          </a:p>
         </p:txBody>
       </p:sp>
       <p:sp>
@@ -6080,6 +6037,124 @@
     <p:extLst>
       <p:ext uri="{BB962C8B-B14F-4D97-AF65-F5344CB8AC3E}">
         <p14:creationId xmlns:p14="http://schemas.microsoft.com/office/powerpoint/2010/main" val="2780331070"/>
+      </p:ext>
+    </p:extLst>
+  </p:cSld>
+  <p:clrMapOvr>
+    <a:masterClrMapping/>
+  </p:clrMapOvr>
+  <p:transition>
+    <p:fade/>
+  </p:transition>
+  <p:timing>
+    <p:tnLst>
+      <p:par>
+        <p:cTn id="1" dur="indefinite" restart="never" nodeType="tmRoot"/>
+      </p:par>
+    </p:tnLst>
+  </p:timing>
+</p:sld>
+</file>
+
+<file path=ppt/slides/slide16.xml><?xml version="1.0" encoding="utf-8"?>
+<p:sld xmlns:a="http://schemas.openxmlformats.org/drawingml/2006/main" xmlns:r="http://schemas.openxmlformats.org/officeDocument/2006/relationships" xmlns:p="http://schemas.openxmlformats.org/presentationml/2006/main">
+  <p:cSld>
+    <p:spTree>
+      <p:nvGrpSpPr>
+        <p:cNvPr id="1" name=""/>
+        <p:cNvGrpSpPr/>
+        <p:nvPr/>
+      </p:nvGrpSpPr>
+      <p:grpSpPr>
+        <a:xfrm>
+          <a:off x="0" y="0"/>
+          <a:ext cx="0" cy="0"/>
+          <a:chOff x="0" y="0"/>
+          <a:chExt cx="0" cy="0"/>
+        </a:xfrm>
+      </p:grpSpPr>
+      <p:sp>
+        <p:nvSpPr>
+          <p:cNvPr id="2" name="Text Placeholder 1"/>
+          <p:cNvSpPr>
+            <a:spLocks noGrp="1"/>
+          </p:cNvSpPr>
+          <p:nvPr>
+            <p:ph type="body" sz="quarter" idx="10"/>
+          </p:nvPr>
+        </p:nvSpPr>
+        <p:spPr>
+          <a:xfrm>
+            <a:off x="274638" y="1212850"/>
+            <a:ext cx="11887200" cy="1957459"/>
+          </a:xfrm>
+        </p:spPr>
+        <p:txBody>
+          <a:bodyPr/>
+          <a:lstStyle/>
+          <a:p>
+            <a:pPr marL="0" indent="0">
+              <a:buNone/>
+            </a:pPr>
+            <a:endParaRPr lang="en-US" dirty="0" smtClean="0"/>
+          </a:p>
+          <a:p>
+            <a:pPr marL="0" indent="0">
+              <a:buNone/>
+            </a:pPr>
+            <a:r>
+              <a:rPr lang="en-US" sz="3200" dirty="0" smtClean="0"/>
+              <a:t>github.com/</a:t>
+            </a:r>
+            <a:r>
+              <a:rPr lang="en-US" sz="3200" dirty="0" err="1" smtClean="0"/>
+              <a:t>jlattimer</a:t>
+            </a:r>
+            <a:r>
+              <a:rPr lang="en-US" sz="3200" dirty="0" smtClean="0"/>
+              <a:t>/</a:t>
+            </a:r>
+            <a:r>
+              <a:rPr lang="en-US" sz="3200" dirty="0" err="1" smtClean="0"/>
+              <a:t>GoingBeyondReSharperWithRoslyn_Demo</a:t>
+            </a:r>
+            <a:endParaRPr lang="en-US" sz="3200" dirty="0"/>
+          </a:p>
+          <a:p>
+            <a:pPr marL="0" indent="0">
+              <a:buNone/>
+            </a:pPr>
+            <a:endParaRPr lang="en-US" dirty="0"/>
+          </a:p>
+        </p:txBody>
+      </p:sp>
+      <p:sp>
+        <p:nvSpPr>
+          <p:cNvPr id="3" name="Title 2"/>
+          <p:cNvSpPr>
+            <a:spLocks noGrp="1"/>
+          </p:cNvSpPr>
+          <p:nvPr>
+            <p:ph type="title"/>
+          </p:nvPr>
+        </p:nvSpPr>
+        <p:spPr/>
+        <p:txBody>
+          <a:bodyPr/>
+          <a:lstStyle/>
+          <a:p>
+            <a:r>
+              <a:rPr lang="en-US" dirty="0" smtClean="0"/>
+              <a:t>Sample Code &amp; Slides</a:t>
+            </a:r>
+            <a:endParaRPr lang="en-US" dirty="0"/>
+          </a:p>
+        </p:txBody>
+      </p:sp>
+    </p:spTree>
+    <p:extLst>
+      <p:ext uri="{BB962C8B-B14F-4D97-AF65-F5344CB8AC3E}">
+        <p14:creationId xmlns:p14="http://schemas.microsoft.com/office/powerpoint/2010/main" val="1281029628"/>
       </p:ext>
     </p:extLst>
   </p:cSld>
@@ -6970,7 +7045,15 @@
             </a:r>
             <a:r>
               <a:rPr lang="en-US" sz="3200" dirty="0"/>
-              <a:t>. CRM Consultant – PowerObjects</a:t>
+              <a:t>. </a:t>
+            </a:r>
+            <a:r>
+              <a:rPr lang="en-US" sz="3200" dirty="0" smtClean="0"/>
+              <a:t>Technical Architect – </a:t>
+            </a:r>
+            <a:r>
+              <a:rPr lang="en-US" sz="3200" dirty="0"/>
+              <a:t>PowerObjects</a:t>
             </a:r>
           </a:p>
           <a:p>
@@ -7432,7 +7515,15 @@
           <a:p>
             <a:r>
               <a:rPr lang="en-US" dirty="0"/>
-              <a:t>Latest CTP (6) Versions:</a:t>
+              <a:t>Latest </a:t>
+            </a:r>
+            <a:r>
+              <a:rPr lang="en-US" dirty="0" smtClean="0"/>
+              <a:t>RC Versions</a:t>
+            </a:r>
+            <a:r>
+              <a:rPr lang="en-US" dirty="0"/>
+              <a:t>:</a:t>
             </a:r>
           </a:p>
           <a:p>

</xml_diff>